<commit_message>
Added filament stuff to storyboard
</commit_message>
<xml_diff>
--- a/StoryBoard.pptx
+++ b/StoryBoard.pptx
@@ -113,7 +113,80 @@
       </a:defRPr>
     </a:lvl9pPr>
   </p:defaultTextStyle>
+  <p:extLst>
+    <p:ext uri="{EFAFB233-063F-42B5-8137-9DF3F51BA10A}">
+      <p15:sldGuideLst xmlns:p15="http://schemas.microsoft.com/office/powerpoint/2012/main"/>
+    </p:ext>
+  </p:extLst>
 </p:presentation>
+</file>
+
+<file path=ppt/commentAuthors.xml><?xml version="1.0" encoding="utf-8"?>
+<p:cmAuthorLst xmlns:a="http://schemas.openxmlformats.org/drawingml/2006/main" xmlns:r="http://schemas.openxmlformats.org/officeDocument/2006/relationships" xmlns:p="http://schemas.openxmlformats.org/presentationml/2006/main">
+  <p:cmAuthor id="1" name="Kovacic, Aidan (kovaciad)" initials="KA(" lastIdx="4" clrIdx="0">
+    <p:extLst>
+      <p:ext uri="{19B8F6BF-5375-455C-9EA6-DF929625EA0E}">
+        <p15:presenceInfo xmlns:p15="http://schemas.microsoft.com/office/powerpoint/2012/main" userId="Kovacic, Aidan (kovaciad)" providerId="None"/>
+      </p:ext>
+    </p:extLst>
+  </p:cmAuthor>
+</p:cmAuthorLst>
+</file>
+
+<file path=ppt/comments/comment1.xml><?xml version="1.0" encoding="utf-8"?>
+<p:cmLst xmlns:a="http://schemas.openxmlformats.org/drawingml/2006/main" xmlns:r="http://schemas.openxmlformats.org/officeDocument/2006/relationships" xmlns:p="http://schemas.openxmlformats.org/presentationml/2006/main">
+  <p:cm authorId="1" dt="2021-05-26T16:47:10.106" idx="1">
+    <p:pos x="10" y="10"/>
+    <p:text>This could probably be a dropdown in the Add/Edit model screen</p:text>
+    <p:extLst>
+      <p:ext uri="{C676402C-5697-4E1C-873F-D02D1690AC5C}">
+        <p15:threadingInfo xmlns:p15="http://schemas.microsoft.com/office/powerpoint/2012/main" timeZoneBias="240"/>
+      </p:ext>
+    </p:extLst>
+  </p:cm>
+</p:cmLst>
+</file>
+
+<file path=ppt/comments/comment2.xml><?xml version="1.0" encoding="utf-8"?>
+<p:cmLst xmlns:a="http://schemas.openxmlformats.org/drawingml/2006/main" xmlns:r="http://schemas.openxmlformats.org/officeDocument/2006/relationships" xmlns:p="http://schemas.openxmlformats.org/presentationml/2006/main">
+  <p:cm authorId="1" dt="2021-05-26T16:47:28.025" idx="2">
+    <p:pos x="10" y="10"/>
+    <p:text>This could probably be a dropdown in the model adding file. We should try to reduce screens as much as humanly possible.</p:text>
+    <p:extLst>
+      <p:ext uri="{C676402C-5697-4E1C-873F-D02D1690AC5C}">
+        <p15:threadingInfo xmlns:p15="http://schemas.microsoft.com/office/powerpoint/2012/main" timeZoneBias="240"/>
+      </p:ext>
+    </p:extLst>
+  </p:cm>
+</p:cmLst>
+</file>
+
+<file path=ppt/comments/comment3.xml><?xml version="1.0" encoding="utf-8"?>
+<p:cmLst xmlns:a="http://schemas.openxmlformats.org/drawingml/2006/main" xmlns:r="http://schemas.openxmlformats.org/officeDocument/2006/relationships" xmlns:p="http://schemas.openxmlformats.org/presentationml/2006/main">
+  <p:cm authorId="1" dt="2021-05-26T16:48:08.680" idx="3">
+    <p:pos x="10" y="10"/>
+    <p:text>This could be a dropdown of Add/Edit Printer. For the most part, I believe we should do the brunt of the work here and leave this to the end user only for edge cases (random brands we've never heard of/new ones.)</p:text>
+    <p:extLst>
+      <p:ext uri="{C676402C-5697-4E1C-873F-D02D1690AC5C}">
+        <p15:threadingInfo xmlns:p15="http://schemas.microsoft.com/office/powerpoint/2012/main" timeZoneBias="240"/>
+      </p:ext>
+    </p:extLst>
+  </p:cm>
+</p:cmLst>
+</file>
+
+<file path=ppt/comments/comment4.xml><?xml version="1.0" encoding="utf-8"?>
+<p:cmLst xmlns:a="http://schemas.openxmlformats.org/drawingml/2006/main" xmlns:r="http://schemas.openxmlformats.org/officeDocument/2006/relationships" xmlns:p="http://schemas.openxmlformats.org/presentationml/2006/main">
+  <p:cm authorId="1" dt="2021-05-26T16:51:23.389" idx="4">
+    <p:pos x="10" y="10"/>
+    <p:text>Could be combined as a dropdown in Add/Edit Material as with the previous ones.</p:text>
+    <p:extLst>
+      <p:ext uri="{C676402C-5697-4E1C-873F-D02D1690AC5C}">
+        <p15:threadingInfo xmlns:p15="http://schemas.microsoft.com/office/powerpoint/2012/main" timeZoneBias="240"/>
+      </p:ext>
+    </p:extLst>
+  </p:cm>
+</p:cmLst>
 </file>
 
 <file path=ppt/slideLayouts/slideLayout1.xml><?xml version="1.0" encoding="utf-8"?>
@@ -263,7 +336,7 @@
           <a:p>
             <a:fld id="{F2CE2D40-AB07-453D-9976-765E6A0CE979}" type="datetimeFigureOut">
               <a:rPr lang="en-US" smtClean="0"/>
-              <a:t>5/25/2021</a:t>
+              <a:t>5/26/2021</a:t>
             </a:fld>
             <a:endParaRPr lang="en-US"/>
           </a:p>
@@ -461,7 +534,7 @@
           <a:p>
             <a:fld id="{F2CE2D40-AB07-453D-9976-765E6A0CE979}" type="datetimeFigureOut">
               <a:rPr lang="en-US" smtClean="0"/>
-              <a:t>5/25/2021</a:t>
+              <a:t>5/26/2021</a:t>
             </a:fld>
             <a:endParaRPr lang="en-US"/>
           </a:p>
@@ -669,7 +742,7 @@
           <a:p>
             <a:fld id="{F2CE2D40-AB07-453D-9976-765E6A0CE979}" type="datetimeFigureOut">
               <a:rPr lang="en-US" smtClean="0"/>
-              <a:t>5/25/2021</a:t>
+              <a:t>5/26/2021</a:t>
             </a:fld>
             <a:endParaRPr lang="en-US"/>
           </a:p>
@@ -867,7 +940,7 @@
           <a:p>
             <a:fld id="{F2CE2D40-AB07-453D-9976-765E6A0CE979}" type="datetimeFigureOut">
               <a:rPr lang="en-US" smtClean="0"/>
-              <a:t>5/25/2021</a:t>
+              <a:t>5/26/2021</a:t>
             </a:fld>
             <a:endParaRPr lang="en-US"/>
           </a:p>
@@ -1142,7 +1215,7 @@
           <a:p>
             <a:fld id="{F2CE2D40-AB07-453D-9976-765E6A0CE979}" type="datetimeFigureOut">
               <a:rPr lang="en-US" smtClean="0"/>
-              <a:t>5/25/2021</a:t>
+              <a:t>5/26/2021</a:t>
             </a:fld>
             <a:endParaRPr lang="en-US"/>
           </a:p>
@@ -1407,7 +1480,7 @@
           <a:p>
             <a:fld id="{F2CE2D40-AB07-453D-9976-765E6A0CE979}" type="datetimeFigureOut">
               <a:rPr lang="en-US" smtClean="0"/>
-              <a:t>5/25/2021</a:t>
+              <a:t>5/26/2021</a:t>
             </a:fld>
             <a:endParaRPr lang="en-US"/>
           </a:p>
@@ -1819,7 +1892,7 @@
           <a:p>
             <a:fld id="{F2CE2D40-AB07-453D-9976-765E6A0CE979}" type="datetimeFigureOut">
               <a:rPr lang="en-US" smtClean="0"/>
-              <a:t>5/25/2021</a:t>
+              <a:t>5/26/2021</a:t>
             </a:fld>
             <a:endParaRPr lang="en-US"/>
           </a:p>
@@ -1960,7 +2033,7 @@
           <a:p>
             <a:fld id="{F2CE2D40-AB07-453D-9976-765E6A0CE979}" type="datetimeFigureOut">
               <a:rPr lang="en-US" smtClean="0"/>
-              <a:t>5/25/2021</a:t>
+              <a:t>5/26/2021</a:t>
             </a:fld>
             <a:endParaRPr lang="en-US"/>
           </a:p>
@@ -2073,7 +2146,7 @@
           <a:p>
             <a:fld id="{F2CE2D40-AB07-453D-9976-765E6A0CE979}" type="datetimeFigureOut">
               <a:rPr lang="en-US" smtClean="0"/>
-              <a:t>5/25/2021</a:t>
+              <a:t>5/26/2021</a:t>
             </a:fld>
             <a:endParaRPr lang="en-US"/>
           </a:p>
@@ -2384,7 +2457,7 @@
           <a:p>
             <a:fld id="{F2CE2D40-AB07-453D-9976-765E6A0CE979}" type="datetimeFigureOut">
               <a:rPr lang="en-US" smtClean="0"/>
-              <a:t>5/25/2021</a:t>
+              <a:t>5/26/2021</a:t>
             </a:fld>
             <a:endParaRPr lang="en-US"/>
           </a:p>
@@ -2672,7 +2745,7 @@
           <a:p>
             <a:fld id="{F2CE2D40-AB07-453D-9976-765E6A0CE979}" type="datetimeFigureOut">
               <a:rPr lang="en-US" smtClean="0"/>
-              <a:t>5/25/2021</a:t>
+              <a:t>5/26/2021</a:t>
             </a:fld>
             <a:endParaRPr lang="en-US"/>
           </a:p>
@@ -2913,7 +2986,7 @@
           <a:p>
             <a:fld id="{F2CE2D40-AB07-453D-9976-765E6A0CE979}" type="datetimeFigureOut">
               <a:rPr lang="en-US" smtClean="0"/>
-              <a:t>5/25/2021</a:t>
+              <a:t>5/26/2021</a:t>
             </a:fld>
             <a:endParaRPr lang="en-US"/>
           </a:p>
@@ -3598,7 +3671,7 @@
         </p:blipFill>
         <p:spPr>
           <a:xfrm>
-            <a:off x="5919947" y="0"/>
+            <a:off x="5937645" y="0"/>
             <a:ext cx="4808393" cy="6858000"/>
           </a:xfrm>
           <a:prstGeom prst="rect">
@@ -3606,6 +3679,116 @@
           </a:prstGeom>
         </p:spPr>
       </p:pic>
+      <p:pic>
+        <p:nvPicPr>
+          <p:cNvPr id="4" name="Picture 3" descr="A picture containing text&#10;&#10;Description automatically generated">
+            <a:extLst>
+              <a:ext uri="{FF2B5EF4-FFF2-40B4-BE49-F238E27FC236}">
+                <a16:creationId xmlns:a16="http://schemas.microsoft.com/office/drawing/2014/main" id="{C49FC815-E7E1-408F-A171-ADC3FAEF2FB4}"/>
+              </a:ext>
+            </a:extLst>
+          </p:cNvPr>
+          <p:cNvPicPr>
+            <a:picLocks noChangeAspect="1"/>
+          </p:cNvPicPr>
+          <p:nvPr/>
+        </p:nvPicPr>
+        <p:blipFill>
+          <a:blip r:embed="rId3">
+            <a:extLst>
+              <a:ext uri="{28A0092B-C50C-407E-A947-70E740481C1C}">
+                <a14:useLocalDpi xmlns:a14="http://schemas.microsoft.com/office/drawing/2010/main" val="0"/>
+              </a:ext>
+            </a:extLst>
+          </a:blip>
+          <a:stretch>
+            <a:fillRect/>
+          </a:stretch>
+        </p:blipFill>
+        <p:spPr>
+          <a:xfrm>
+            <a:off x="1369491" y="2775857"/>
+            <a:ext cx="4097915" cy="3073436"/>
+          </a:xfrm>
+          <a:prstGeom prst="rect">
+            <a:avLst/>
+          </a:prstGeom>
+        </p:spPr>
+      </p:pic>
+      <p:cxnSp>
+        <p:nvCxnSpPr>
+          <p:cNvPr id="7" name="Straight Arrow Connector 6">
+            <a:extLst>
+              <a:ext uri="{FF2B5EF4-FFF2-40B4-BE49-F238E27FC236}">
+                <a16:creationId xmlns:a16="http://schemas.microsoft.com/office/drawing/2014/main" id="{AB0CDD27-6323-4654-AE37-DC5455FC8E24}"/>
+              </a:ext>
+            </a:extLst>
+          </p:cNvPr>
+          <p:cNvCxnSpPr/>
+          <p:nvPr/>
+        </p:nvCxnSpPr>
+        <p:spPr>
+          <a:xfrm flipH="1">
+            <a:off x="3638006" y="1365069"/>
+            <a:ext cx="2638697" cy="1188720"/>
+          </a:xfrm>
+          <a:prstGeom prst="straightConnector1">
+            <a:avLst/>
+          </a:prstGeom>
+          <a:ln>
+            <a:tailEnd type="triangle"/>
+          </a:ln>
+        </p:spPr>
+        <p:style>
+          <a:lnRef idx="1">
+            <a:schemeClr val="accent1"/>
+          </a:lnRef>
+          <a:fillRef idx="0">
+            <a:schemeClr val="accent1"/>
+          </a:fillRef>
+          <a:effectRef idx="0">
+            <a:schemeClr val="accent1"/>
+          </a:effectRef>
+          <a:fontRef idx="minor">
+            <a:schemeClr val="tx1"/>
+          </a:fontRef>
+        </p:style>
+      </p:cxnSp>
+      <p:sp>
+        <p:nvSpPr>
+          <p:cNvPr id="8" name="TextBox 7">
+            <a:extLst>
+              <a:ext uri="{FF2B5EF4-FFF2-40B4-BE49-F238E27FC236}">
+                <a16:creationId xmlns:a16="http://schemas.microsoft.com/office/drawing/2014/main" id="{90D939C7-75C5-423C-A1A8-F6233EF23705}"/>
+              </a:ext>
+            </a:extLst>
+          </p:cNvPr>
+          <p:cNvSpPr txBox="1"/>
+          <p:nvPr/>
+        </p:nvSpPr>
+        <p:spPr>
+          <a:xfrm>
+            <a:off x="3740191" y="1522034"/>
+            <a:ext cx="1551530" cy="369332"/>
+          </a:xfrm>
+          <a:prstGeom prst="rect">
+            <a:avLst/>
+          </a:prstGeom>
+          <a:noFill/>
+        </p:spPr>
+        <p:txBody>
+          <a:bodyPr wrap="square" rtlCol="0">
+            <a:spAutoFit/>
+          </a:bodyPr>
+          <a:lstStyle/>
+          <a:p>
+            <a:r>
+              <a:rPr lang="en-US" dirty="0"/>
+              <a:t>If FDM Printer</a:t>
+            </a:r>
+          </a:p>
+        </p:txBody>
+      </p:sp>
     </p:spTree>
     <p:extLst>
       <p:ext uri="{BB962C8B-B14F-4D97-AF65-F5344CB8AC3E}">
@@ -3870,15 +4053,20 @@
           <p:nvPr/>
         </p:nvPicPr>
         <p:blipFill>
-          <a:blip r:embed="rId2"/>
-          <a:stretch>
-            <a:fillRect/>
-          </a:stretch>
+          <a:blip r:embed="rId2">
+            <a:extLst>
+              <a:ext uri="{28A0092B-C50C-407E-A947-70E740481C1C}">
+                <a14:useLocalDpi xmlns:a14="http://schemas.microsoft.com/office/drawing/2010/main" val="0"/>
+              </a:ext>
+            </a:extLst>
+          </a:blip>
+          <a:srcRect/>
+          <a:stretch/>
         </p:blipFill>
         <p:spPr>
           <a:xfrm>
-            <a:off x="6255745" y="0"/>
-            <a:ext cx="5098055" cy="6858000"/>
+            <a:off x="6255745" y="2888"/>
+            <a:ext cx="5098055" cy="6852224"/>
           </a:xfrm>
           <a:prstGeom prst="rect">
             <a:avLst/>
@@ -4045,7 +4233,7 @@
           <a:p>
             <a:r>
               <a:rPr lang="en-US" dirty="0"/>
-              <a:t>Add/Edit Resin</a:t>
+              <a:t>Add/Edit Material</a:t>
             </a:r>
           </a:p>
         </p:txBody>
@@ -4065,15 +4253,20 @@
           <p:nvPr/>
         </p:nvPicPr>
         <p:blipFill>
-          <a:blip r:embed="rId2"/>
-          <a:stretch>
-            <a:fillRect/>
-          </a:stretch>
+          <a:blip r:embed="rId2">
+            <a:extLst>
+              <a:ext uri="{28A0092B-C50C-407E-A947-70E740481C1C}">
+                <a14:useLocalDpi xmlns:a14="http://schemas.microsoft.com/office/drawing/2010/main" val="0"/>
+              </a:ext>
+            </a:extLst>
+          </a:blip>
+          <a:srcRect/>
+          <a:stretch/>
         </p:blipFill>
         <p:spPr>
           <a:xfrm>
-            <a:off x="5836489" y="0"/>
-            <a:ext cx="5098055" cy="6858000"/>
+            <a:off x="5836489" y="2888"/>
+            <a:ext cx="5098055" cy="6852224"/>
           </a:xfrm>
           <a:prstGeom prst="rect">
             <a:avLst/>
@@ -4128,12 +4321,14 @@
         </p:nvSpPr>
         <p:spPr>
           <a:xfrm>
-            <a:off x="838200" y="365125"/>
-            <a:ext cx="2932134" cy="1325563"/>
+            <a:off x="838199" y="365125"/>
+            <a:ext cx="3714345" cy="1813871"/>
           </a:xfrm>
         </p:spPr>
         <p:txBody>
-          <a:bodyPr/>
+          <a:bodyPr>
+            <a:normAutofit/>
+          </a:bodyPr>
           <a:lstStyle/>
           <a:p>
             <a:r>
@@ -4145,7 +4340,7 @@
             </a:br>
             <a:r>
               <a:rPr lang="en-US" dirty="0"/>
-              <a:t>Resin Brand</a:t>
+              <a:t>Material Brand</a:t>
             </a:r>
           </a:p>
         </p:txBody>

</xml_diff>